<commit_message>
Atualização geral dos artefatos
</commit_message>
<xml_diff>
--- a/Apresentação/Bill - Apresentação.pptx
+++ b/Apresentação/Bill - Apresentação.pptx
@@ -29,16 +29,17 @@
     <p:sldId id="273" r:id="rId24"/>
     <p:sldId id="274" r:id="rId25"/>
     <p:sldId id="275" r:id="rId26"/>
+    <p:sldId id="276" r:id="rId27"/>
   </p:sldIdLst>
   <p:sldSz cy="5143500" cx="9144000"/>
   <p:notesSz cx="6858000" cy="9144000"/>
   <p:embeddedFontLst>
     <p:embeddedFont>
       <p:font typeface="Roboto"/>
-      <p:regular r:id="rId27"/>
-      <p:bold r:id="rId28"/>
-      <p:italic r:id="rId29"/>
-      <p:boldItalic r:id="rId30"/>
+      <p:regular r:id="rId28"/>
+      <p:bold r:id="rId29"/>
+      <p:italic r:id="rId30"/>
+      <p:boldItalic r:id="rId31"/>
     </p:embeddedFont>
   </p:embeddedFontLst>
   <p:defaultTextStyle>
@@ -1532,7 +1533,7 @@
       </p:grpSpPr>
       <p:sp>
         <p:nvSpPr>
-          <p:cNvPr id="230" name="Google Shape;230;g91494f4511_0_72:notes"/>
+          <p:cNvPr id="230" name="Google Shape;230;g9882ceeb86_0_0:notes"/>
           <p:cNvSpPr/>
           <p:nvPr>
             <p:ph idx="2" type="sldImg"/>
@@ -1567,7 +1568,7 @@
       </p:sp>
       <p:sp>
         <p:nvSpPr>
-          <p:cNvPr id="231" name="Google Shape;231;g91494f4511_0_72:notes"/>
+          <p:cNvPr id="231" name="Google Shape;231;g9882ceeb86_0_0:notes"/>
           <p:cNvSpPr txBox="1"/>
           <p:nvPr>
             <p:ph idx="1" type="body"/>
@@ -1598,7 +1599,8 @@
               <a:buNone/>
             </a:pPr>
             <a:r>
-              <a:t/>
+              <a:rPr lang="pt-BR"/>
+              <a:t>https://drive.google.com/file/d/1JkC2ss_yOPtSjkJ7lTkBicGrCAOs3Y4s/view?usp=sharing</a:t>
             </a:r>
             <a:endParaRPr/>
           </a:p>
@@ -1617,7 +1619,7 @@
   <p:cSld>
     <p:spTree>
       <p:nvGrpSpPr>
-        <p:cNvPr id="238" name="Shape 238"/>
+        <p:cNvPr id="235" name="Shape 235"/>
         <p:cNvGrpSpPr/>
         <p:nvPr/>
       </p:nvGrpSpPr>
@@ -1631,7 +1633,7 @@
       </p:grpSpPr>
       <p:sp>
         <p:nvSpPr>
-          <p:cNvPr id="239" name="Google Shape;239;g91494f4511_0_207:notes"/>
+          <p:cNvPr id="236" name="Google Shape;236;g91494f4511_0_72:notes"/>
           <p:cNvSpPr/>
           <p:nvPr>
             <p:ph idx="2" type="sldImg"/>
@@ -1666,7 +1668,7 @@
       </p:sp>
       <p:sp>
         <p:nvSpPr>
-          <p:cNvPr id="240" name="Google Shape;240;g91494f4511_0_207:notes"/>
+          <p:cNvPr id="237" name="Google Shape;237;g91494f4511_0_72:notes"/>
           <p:cNvSpPr txBox="1"/>
           <p:nvPr>
             <p:ph idx="1" type="body"/>
@@ -1730,7 +1732,7 @@
       </p:grpSpPr>
       <p:sp>
         <p:nvSpPr>
-          <p:cNvPr id="245" name="Google Shape;245;g92ea6614ae_2_0:notes"/>
+          <p:cNvPr id="245" name="Google Shape;245;g91494f4511_0_207:notes"/>
           <p:cNvSpPr/>
           <p:nvPr>
             <p:ph idx="2" type="sldImg"/>
@@ -1765,7 +1767,7 @@
       </p:sp>
       <p:sp>
         <p:nvSpPr>
-          <p:cNvPr id="246" name="Google Shape;246;g92ea6614ae_2_0:notes"/>
+          <p:cNvPr id="246" name="Google Shape;246;g91494f4511_0_207:notes"/>
           <p:cNvSpPr txBox="1"/>
           <p:nvPr>
             <p:ph idx="1" type="body"/>
@@ -1928,7 +1930,7 @@
       </p:grpSpPr>
       <p:sp>
         <p:nvSpPr>
-          <p:cNvPr id="251" name="Google Shape;251;g9353ccf216_0_8:notes"/>
+          <p:cNvPr id="251" name="Google Shape;251;g92ea6614ae_2_0:notes"/>
           <p:cNvSpPr/>
           <p:nvPr>
             <p:ph idx="2" type="sldImg"/>
@@ -1963,7 +1965,106 @@
       </p:sp>
       <p:sp>
         <p:nvSpPr>
-          <p:cNvPr id="252" name="Google Shape;252;g9353ccf216_0_8:notes"/>
+          <p:cNvPr id="252" name="Google Shape;252;g92ea6614ae_2_0:notes"/>
+          <p:cNvSpPr txBox="1"/>
+          <p:nvPr>
+            <p:ph idx="1" type="body"/>
+          </p:nvPr>
+        </p:nvSpPr>
+        <p:spPr>
+          <a:xfrm>
+            <a:off x="685800" y="4343400"/>
+            <a:ext cx="5486400" cy="4114800"/>
+          </a:xfrm>
+          <a:prstGeom prst="rect">
+            <a:avLst/>
+          </a:prstGeom>
+        </p:spPr>
+        <p:txBody>
+          <a:bodyPr anchorCtr="0" anchor="t" bIns="91425" lIns="91425" spcFirstLastPara="1" rIns="91425" wrap="square" tIns="91425">
+            <a:noAutofit/>
+          </a:bodyPr>
+          <a:lstStyle/>
+          <a:p>
+            <a:pPr indent="0" lvl="0" marL="0" rtl="0" algn="l">
+              <a:spcBef>
+                <a:spcPts val="0"/>
+              </a:spcBef>
+              <a:spcAft>
+                <a:spcPts val="0"/>
+              </a:spcAft>
+              <a:buNone/>
+            </a:pPr>
+            <a:r>
+              <a:t/>
+            </a:r>
+            <a:endParaRPr/>
+          </a:p>
+        </p:txBody>
+      </p:sp>
+    </p:spTree>
+  </p:cSld>
+  <p:clrMapOvr>
+    <a:masterClrMapping/>
+  </p:clrMapOvr>
+</p:notes>
+</file>
+
+<file path=ppt/notesSlides/notesSlide21.xml><?xml version="1.0" encoding="utf-8"?>
+<p:notes xmlns:a="http://schemas.openxmlformats.org/drawingml/2006/main" xmlns:r="http://schemas.openxmlformats.org/officeDocument/2006/relationships" xmlns:mc="http://schemas.openxmlformats.org/markup-compatibility/2006" xmlns:mv="urn:schemas-microsoft-com:mac:vml" xmlns:p="http://schemas.openxmlformats.org/presentationml/2006/main" xmlns:c="http://schemas.openxmlformats.org/drawingml/2006/chart" xmlns:dgm="http://schemas.openxmlformats.org/drawingml/2006/diagram" xmlns:o="urn:schemas-microsoft-com:office:office" xmlns:v="urn:schemas-microsoft-com:vml" xmlns:pvml="urn:schemas-microsoft-com:office:powerpoint" xmlns:com="http://schemas.openxmlformats.org/drawingml/2006/compatibility" xmlns:p14="http://schemas.microsoft.com/office/powerpoint/2010/main" xmlns:p15="http://schemas.microsoft.com/office/powerpoint/2012/main" xmlns:ahyp="http://schemas.microsoft.com/office/drawing/2018/hyperlinkcolor" showMasterPhAnim="0" showMasterSp="0">
+  <p:cSld>
+    <p:spTree>
+      <p:nvGrpSpPr>
+        <p:cNvPr id="256" name="Shape 256"/>
+        <p:cNvGrpSpPr/>
+        <p:nvPr/>
+      </p:nvGrpSpPr>
+      <p:grpSpPr>
+        <a:xfrm>
+          <a:off x="0" y="0"/>
+          <a:ext cx="0" cy="0"/>
+          <a:chOff x="0" y="0"/>
+          <a:chExt cx="0" cy="0"/>
+        </a:xfrm>
+      </p:grpSpPr>
+      <p:sp>
+        <p:nvSpPr>
+          <p:cNvPr id="257" name="Google Shape;257;g9353ccf216_0_13:notes"/>
+          <p:cNvSpPr/>
+          <p:nvPr>
+            <p:ph idx="2" type="sldImg"/>
+          </p:nvPr>
+        </p:nvSpPr>
+        <p:spPr>
+          <a:xfrm>
+            <a:off x="381300" y="685800"/>
+            <a:ext cx="6096000" cy="3429000"/>
+          </a:xfrm>
+          <a:custGeom>
+            <a:rect b="b" l="l" r="r" t="t"/>
+            <a:pathLst>
+              <a:path extrusionOk="0" h="120000" w="120000">
+                <a:moveTo>
+                  <a:pt x="0" y="0"/>
+                </a:moveTo>
+                <a:lnTo>
+                  <a:pt x="120000" y="0"/>
+                </a:lnTo>
+                <a:lnTo>
+                  <a:pt x="120000" y="120000"/>
+                </a:lnTo>
+                <a:lnTo>
+                  <a:pt x="0" y="120000"/>
+                </a:lnTo>
+                <a:close/>
+              </a:path>
+            </a:pathLst>
+          </a:custGeom>
+        </p:spPr>
+      </p:sp>
+      <p:sp>
+        <p:nvSpPr>
+          <p:cNvPr id="258" name="Google Shape;258;g9353ccf216_0_13:notes"/>
           <p:cNvSpPr txBox="1"/>
           <p:nvPr>
             <p:ph idx="1" type="body"/>
@@ -14398,7 +14499,7 @@
             </a:pPr>
             <a:r>
               <a:rPr lang="pt-BR"/>
-              <a:t>PostegreSQL para realizar o armazenamento das informações</a:t>
+              <a:t>PostgreSQL para realizar o armazenamento das informações</a:t>
             </a:r>
             <a:br>
               <a:rPr lang="pt-BR"/>
@@ -14687,7 +14788,7 @@
 </file>
 
 <file path=ppt/slides/slide14.xml><?xml version="1.0" encoding="utf-8"?>
-<p:sld xmlns:a="http://schemas.openxmlformats.org/drawingml/2006/main" xmlns:r="http://schemas.openxmlformats.org/officeDocument/2006/relationships" xmlns:mc="http://schemas.openxmlformats.org/markup-compatibility/2006" xmlns:mv="urn:schemas-microsoft-com:mac:vml" xmlns:p="http://schemas.openxmlformats.org/presentationml/2006/main" xmlns:c="http://schemas.openxmlformats.org/drawingml/2006/chart" xmlns:dgm="http://schemas.openxmlformats.org/drawingml/2006/diagram" xmlns:o="urn:schemas-microsoft-com:office:office" xmlns:v="urn:schemas-microsoft-com:vml" xmlns:pvml="urn:schemas-microsoft-com:office:powerpoint" xmlns:com="http://schemas.openxmlformats.org/drawingml/2006/compatibility" xmlns:p14="http://schemas.microsoft.com/office/powerpoint/2010/main" xmlns:p15="http://schemas.microsoft.com/office/powerpoint/2012/main" xmlns:ahyp="http://schemas.microsoft.com/office/drawing/2018/hyperlinkcolor">
+<p:sld xmlns:a="http://schemas.openxmlformats.org/drawingml/2006/main" xmlns:r="http://schemas.openxmlformats.org/officeDocument/2006/relationships" xmlns:mc="http://schemas.openxmlformats.org/markup-compatibility/2006" xmlns:mv="urn:schemas-microsoft-com:mac:vml" xmlns:p="http://schemas.openxmlformats.org/presentationml/2006/main" xmlns:c="http://schemas.openxmlformats.org/drawingml/2006/chart" xmlns:dgm="http://schemas.openxmlformats.org/drawingml/2006/diagram" xmlns:o="urn:schemas-microsoft-com:office:office" xmlns:v="urn:schemas-microsoft-com:vml" xmlns:pvml="urn:schemas-microsoft-com:office:powerpoint" xmlns:com="http://schemas.openxmlformats.org/drawingml/2006/compatibility" xmlns:p14="http://schemas.microsoft.com/office/powerpoint/2010/main" xmlns:p15="http://schemas.microsoft.com/office/powerpoint/2012/main" xmlns:ahyp="http://schemas.microsoft.com/office/drawing/2018/hyperlinkcolor" show="0">
   <p:cSld>
     <p:spTree>
       <p:nvGrpSpPr>
@@ -15086,6 +15187,102 @@
             </a:pPr>
             <a:r>
               <a:rPr lang="pt-BR"/>
+              <a:t>VALIDAÇÃO DO </a:t>
+            </a:r>
+            <a:r>
+              <a:rPr i="1" lang="pt-BR"/>
+              <a:t>MVP</a:t>
+            </a:r>
+            <a:endParaRPr i="1"/>
+          </a:p>
+        </p:txBody>
+      </p:sp>
+      <p:pic>
+        <p:nvPicPr>
+          <p:cNvPr id="234" name="Google Shape;234;p41"/>
+          <p:cNvPicPr preferRelativeResize="0"/>
+          <p:nvPr/>
+        </p:nvPicPr>
+        <p:blipFill rotWithShape="1">
+          <a:blip r:embed="rId3">
+            <a:alphaModFix/>
+          </a:blip>
+          <a:srcRect b="5372" l="18347" r="896" t="12220"/>
+          <a:stretch/>
+        </p:blipFill>
+        <p:spPr>
+          <a:xfrm>
+            <a:off x="1003050" y="1322425"/>
+            <a:ext cx="7137901" cy="3139000"/>
+          </a:xfrm>
+          <a:prstGeom prst="rect">
+            <a:avLst/>
+          </a:prstGeom>
+          <a:noFill/>
+          <a:ln>
+            <a:noFill/>
+          </a:ln>
+        </p:spPr>
+      </p:pic>
+    </p:spTree>
+  </p:cSld>
+  <p:clrMapOvr>
+    <a:masterClrMapping/>
+  </p:clrMapOvr>
+</p:sld>
+</file>
+
+<file path=ppt/slides/slide18.xml><?xml version="1.0" encoding="utf-8"?>
+<p:sld xmlns:a="http://schemas.openxmlformats.org/drawingml/2006/main" xmlns:r="http://schemas.openxmlformats.org/officeDocument/2006/relationships" xmlns:mc="http://schemas.openxmlformats.org/markup-compatibility/2006" xmlns:mv="urn:schemas-microsoft-com:mac:vml" xmlns:p="http://schemas.openxmlformats.org/presentationml/2006/main" xmlns:c="http://schemas.openxmlformats.org/drawingml/2006/chart" xmlns:dgm="http://schemas.openxmlformats.org/drawingml/2006/diagram" xmlns:o="urn:schemas-microsoft-com:office:office" xmlns:v="urn:schemas-microsoft-com:vml" xmlns:pvml="urn:schemas-microsoft-com:office:powerpoint" xmlns:com="http://schemas.openxmlformats.org/drawingml/2006/compatibility" xmlns:p14="http://schemas.microsoft.com/office/powerpoint/2010/main" xmlns:p15="http://schemas.microsoft.com/office/powerpoint/2012/main" xmlns:ahyp="http://schemas.microsoft.com/office/drawing/2018/hyperlinkcolor">
+  <p:cSld>
+    <p:spTree>
+      <p:nvGrpSpPr>
+        <p:cNvPr id="238" name="Shape 238"/>
+        <p:cNvGrpSpPr/>
+        <p:nvPr/>
+      </p:nvGrpSpPr>
+      <p:grpSpPr>
+        <a:xfrm>
+          <a:off x="0" y="0"/>
+          <a:ext cx="0" cy="0"/>
+          <a:chOff x="0" y="0"/>
+          <a:chExt cx="0" cy="0"/>
+        </a:xfrm>
+      </p:grpSpPr>
+      <p:sp>
+        <p:nvSpPr>
+          <p:cNvPr id="239" name="Google Shape;239;p42"/>
+          <p:cNvSpPr txBox="1"/>
+          <p:nvPr>
+            <p:ph type="title"/>
+          </p:nvPr>
+        </p:nvSpPr>
+        <p:spPr>
+          <a:xfrm>
+            <a:off x="311700" y="410000"/>
+            <a:ext cx="8520600" cy="607800"/>
+          </a:xfrm>
+          <a:prstGeom prst="rect">
+            <a:avLst/>
+          </a:prstGeom>
+        </p:spPr>
+        <p:txBody>
+          <a:bodyPr anchorCtr="0" anchor="t" bIns="91425" lIns="91425" spcFirstLastPara="1" rIns="91425" wrap="square" tIns="91425">
+            <a:noAutofit/>
+          </a:bodyPr>
+          <a:lstStyle/>
+          <a:p>
+            <a:pPr indent="0" lvl="0" marL="0" rtl="0" algn="l">
+              <a:spcBef>
+                <a:spcPts val="0"/>
+              </a:spcBef>
+              <a:spcAft>
+                <a:spcPts val="0"/>
+              </a:spcAft>
+              <a:buNone/>
+            </a:pPr>
+            <a:r>
+              <a:rPr lang="pt-BR"/>
               <a:t>CONCLUSÃO</a:t>
             </a:r>
             <a:endParaRPr/>
@@ -15094,7 +15291,7 @@
       </p:sp>
       <p:sp>
         <p:nvSpPr>
-          <p:cNvPr id="234" name="Google Shape;234;p41"/>
+          <p:cNvPr id="240" name="Google Shape;240;p42"/>
           <p:cNvSpPr txBox="1"/>
           <p:nvPr>
             <p:ph idx="1" type="body"/>
@@ -15175,7 +15372,7 @@
       </p:sp>
       <p:pic>
         <p:nvPicPr>
-          <p:cNvPr id="235" name="Google Shape;235;p41"/>
+          <p:cNvPr id="241" name="Google Shape;241;p42"/>
           <p:cNvPicPr preferRelativeResize="0"/>
           <p:nvPr/>
         </p:nvPicPr>
@@ -15203,7 +15400,7 @@
       </p:pic>
       <p:pic>
         <p:nvPicPr>
-          <p:cNvPr id="236" name="Google Shape;236;p41"/>
+          <p:cNvPr id="242" name="Google Shape;242;p42"/>
           <p:cNvPicPr preferRelativeResize="0"/>
           <p:nvPr/>
         </p:nvPicPr>
@@ -15231,7 +15428,7 @@
       </p:pic>
       <p:pic>
         <p:nvPicPr>
-          <p:cNvPr id="237" name="Google Shape;237;p41"/>
+          <p:cNvPr id="243" name="Google Shape;243;p42"/>
           <p:cNvPicPr preferRelativeResize="0"/>
           <p:nvPr/>
         </p:nvPicPr>
@@ -15265,12 +15462,12 @@
 </p:sld>
 </file>
 
-<file path=ppt/slides/slide18.xml><?xml version="1.0" encoding="utf-8"?>
+<file path=ppt/slides/slide19.xml><?xml version="1.0" encoding="utf-8"?>
 <p:sld xmlns:a="http://schemas.openxmlformats.org/drawingml/2006/main" xmlns:r="http://schemas.openxmlformats.org/officeDocument/2006/relationships" xmlns:mc="http://schemas.openxmlformats.org/markup-compatibility/2006" xmlns:mv="urn:schemas-microsoft-com:mac:vml" xmlns:p="http://schemas.openxmlformats.org/presentationml/2006/main" xmlns:c="http://schemas.openxmlformats.org/drawingml/2006/chart" xmlns:dgm="http://schemas.openxmlformats.org/drawingml/2006/diagram" xmlns:o="urn:schemas-microsoft-com:office:office" xmlns:v="urn:schemas-microsoft-com:vml" xmlns:pvml="urn:schemas-microsoft-com:office:powerpoint" xmlns:com="http://schemas.openxmlformats.org/drawingml/2006/compatibility" xmlns:p14="http://schemas.microsoft.com/office/powerpoint/2010/main" xmlns:p15="http://schemas.microsoft.com/office/powerpoint/2012/main" xmlns:ahyp="http://schemas.microsoft.com/office/drawing/2018/hyperlinkcolor">
   <p:cSld>
     <p:spTree>
       <p:nvGrpSpPr>
-        <p:cNvPr id="241" name="Shape 241"/>
+        <p:cNvPr id="247" name="Shape 247"/>
         <p:cNvGrpSpPr/>
         <p:nvPr/>
       </p:nvGrpSpPr>
@@ -15284,7 +15481,7 @@
       </p:grpSpPr>
       <p:sp>
         <p:nvSpPr>
-          <p:cNvPr id="242" name="Google Shape;242;p42"/>
+          <p:cNvPr id="248" name="Google Shape;248;p43"/>
           <p:cNvSpPr txBox="1"/>
           <p:nvPr>
             <p:ph type="title"/>
@@ -15324,7 +15521,7 @@
       </p:sp>
       <p:sp>
         <p:nvSpPr>
-          <p:cNvPr id="243" name="Google Shape;243;p42"/>
+          <p:cNvPr id="249" name="Google Shape;249;p43"/>
           <p:cNvSpPr txBox="1"/>
           <p:nvPr>
             <p:ph idx="1" type="body"/>
@@ -15608,12 +15805,12 @@
 </p:sld>
 </file>
 
-<file path=ppt/slides/slide19.xml><?xml version="1.0" encoding="utf-8"?>
+<file path=ppt/slides/slide2.xml><?xml version="1.0" encoding="utf-8"?>
 <p:sld xmlns:a="http://schemas.openxmlformats.org/drawingml/2006/main" xmlns:r="http://schemas.openxmlformats.org/officeDocument/2006/relationships" xmlns:mc="http://schemas.openxmlformats.org/markup-compatibility/2006" xmlns:mv="urn:schemas-microsoft-com:mac:vml" xmlns:p="http://schemas.openxmlformats.org/presentationml/2006/main" xmlns:c="http://schemas.openxmlformats.org/drawingml/2006/chart" xmlns:dgm="http://schemas.openxmlformats.org/drawingml/2006/diagram" xmlns:o="urn:schemas-microsoft-com:office:office" xmlns:v="urn:schemas-microsoft-com:vml" xmlns:pvml="urn:schemas-microsoft-com:office:powerpoint" xmlns:com="http://schemas.openxmlformats.org/drawingml/2006/compatibility" xmlns:p14="http://schemas.microsoft.com/office/powerpoint/2010/main" xmlns:p15="http://schemas.microsoft.com/office/powerpoint/2012/main" xmlns:ahyp="http://schemas.microsoft.com/office/drawing/2018/hyperlinkcolor">
   <p:cSld>
     <p:spTree>
       <p:nvGrpSpPr>
-        <p:cNvPr id="247" name="Shape 247"/>
+        <p:cNvPr id="135" name="Shape 135"/>
         <p:cNvGrpSpPr/>
         <p:nvPr/>
       </p:nvGrpSpPr>
@@ -15627,7 +15824,72 @@
       </p:grpSpPr>
       <p:sp>
         <p:nvSpPr>
-          <p:cNvPr id="248" name="Google Shape;248;p43"/>
+          <p:cNvPr id="136" name="Google Shape;136;p26"/>
+          <p:cNvSpPr txBox="1"/>
+          <p:nvPr>
+            <p:ph type="title"/>
+          </p:nvPr>
+        </p:nvSpPr>
+        <p:spPr>
+          <a:xfrm>
+            <a:off x="490250" y="526350"/>
+            <a:ext cx="5618700" cy="4090800"/>
+          </a:xfrm>
+          <a:prstGeom prst="rect">
+            <a:avLst/>
+          </a:prstGeom>
+        </p:spPr>
+        <p:txBody>
+          <a:bodyPr anchorCtr="0" anchor="ctr" bIns="91425" lIns="91425" spcFirstLastPara="1" rIns="91425" wrap="square" tIns="91425">
+            <a:noAutofit/>
+          </a:bodyPr>
+          <a:lstStyle/>
+          <a:p>
+            <a:pPr indent="0" lvl="0" marL="0" rtl="0" algn="l">
+              <a:spcBef>
+                <a:spcPts val="0"/>
+              </a:spcBef>
+              <a:spcAft>
+                <a:spcPts val="0"/>
+              </a:spcAft>
+              <a:buNone/>
+            </a:pPr>
+            <a:r>
+              <a:rPr lang="pt-BR"/>
+              <a:t>INTRODUÇÃO</a:t>
+            </a:r>
+            <a:endParaRPr/>
+          </a:p>
+        </p:txBody>
+      </p:sp>
+    </p:spTree>
+  </p:cSld>
+  <p:clrMapOvr>
+    <a:masterClrMapping/>
+  </p:clrMapOvr>
+</p:sld>
+</file>
+
+<file path=ppt/slides/slide20.xml><?xml version="1.0" encoding="utf-8"?>
+<p:sld xmlns:a="http://schemas.openxmlformats.org/drawingml/2006/main" xmlns:r="http://schemas.openxmlformats.org/officeDocument/2006/relationships" xmlns:mc="http://schemas.openxmlformats.org/markup-compatibility/2006" xmlns:mv="urn:schemas-microsoft-com:mac:vml" xmlns:p="http://schemas.openxmlformats.org/presentationml/2006/main" xmlns:c="http://schemas.openxmlformats.org/drawingml/2006/chart" xmlns:dgm="http://schemas.openxmlformats.org/drawingml/2006/diagram" xmlns:o="urn:schemas-microsoft-com:office:office" xmlns:v="urn:schemas-microsoft-com:vml" xmlns:pvml="urn:schemas-microsoft-com:office:powerpoint" xmlns:com="http://schemas.openxmlformats.org/drawingml/2006/compatibility" xmlns:p14="http://schemas.microsoft.com/office/powerpoint/2010/main" xmlns:p15="http://schemas.microsoft.com/office/powerpoint/2012/main" xmlns:ahyp="http://schemas.microsoft.com/office/drawing/2018/hyperlinkcolor">
+  <p:cSld>
+    <p:spTree>
+      <p:nvGrpSpPr>
+        <p:cNvPr id="253" name="Shape 253"/>
+        <p:cNvGrpSpPr/>
+        <p:nvPr/>
+      </p:nvGrpSpPr>
+      <p:grpSpPr>
+        <a:xfrm>
+          <a:off x="0" y="0"/>
+          <a:ext cx="0" cy="0"/>
+          <a:chOff x="0" y="0"/>
+          <a:chExt cx="0" cy="0"/>
+        </a:xfrm>
+      </p:grpSpPr>
+      <p:sp>
+        <p:nvSpPr>
+          <p:cNvPr id="254" name="Google Shape;254;p44"/>
           <p:cNvSpPr txBox="1"/>
           <p:nvPr>
             <p:ph type="title"/>
@@ -15667,7 +15929,7 @@
       </p:sp>
       <p:sp>
         <p:nvSpPr>
-          <p:cNvPr id="249" name="Google Shape;249;p43"/>
+          <p:cNvPr id="255" name="Google Shape;255;p44"/>
           <p:cNvSpPr txBox="1"/>
           <p:nvPr>
             <p:ph idx="1" type="body"/>
@@ -15910,12 +16172,12 @@
 </p:sld>
 </file>
 
-<file path=ppt/slides/slide2.xml><?xml version="1.0" encoding="utf-8"?>
+<file path=ppt/slides/slide21.xml><?xml version="1.0" encoding="utf-8"?>
 <p:sld xmlns:a="http://schemas.openxmlformats.org/drawingml/2006/main" xmlns:r="http://schemas.openxmlformats.org/officeDocument/2006/relationships" xmlns:mc="http://schemas.openxmlformats.org/markup-compatibility/2006" xmlns:mv="urn:schemas-microsoft-com:mac:vml" xmlns:p="http://schemas.openxmlformats.org/presentationml/2006/main" xmlns:c="http://schemas.openxmlformats.org/drawingml/2006/chart" xmlns:dgm="http://schemas.openxmlformats.org/drawingml/2006/diagram" xmlns:o="urn:schemas-microsoft-com:office:office" xmlns:v="urn:schemas-microsoft-com:vml" xmlns:pvml="urn:schemas-microsoft-com:office:powerpoint" xmlns:com="http://schemas.openxmlformats.org/drawingml/2006/compatibility" xmlns:p14="http://schemas.microsoft.com/office/powerpoint/2010/main" xmlns:p15="http://schemas.microsoft.com/office/powerpoint/2012/main" xmlns:ahyp="http://schemas.microsoft.com/office/drawing/2018/hyperlinkcolor">
   <p:cSld>
     <p:spTree>
       <p:nvGrpSpPr>
-        <p:cNvPr id="135" name="Shape 135"/>
+        <p:cNvPr id="259" name="Shape 259"/>
         <p:cNvGrpSpPr/>
         <p:nvPr/>
       </p:nvGrpSpPr>
@@ -15929,72 +16191,7 @@
       </p:grpSpPr>
       <p:sp>
         <p:nvSpPr>
-          <p:cNvPr id="136" name="Google Shape;136;p26"/>
-          <p:cNvSpPr txBox="1"/>
-          <p:nvPr>
-            <p:ph type="title"/>
-          </p:nvPr>
-        </p:nvSpPr>
-        <p:spPr>
-          <a:xfrm>
-            <a:off x="490250" y="526350"/>
-            <a:ext cx="5618700" cy="4090800"/>
-          </a:xfrm>
-          <a:prstGeom prst="rect">
-            <a:avLst/>
-          </a:prstGeom>
-        </p:spPr>
-        <p:txBody>
-          <a:bodyPr anchorCtr="0" anchor="ctr" bIns="91425" lIns="91425" spcFirstLastPara="1" rIns="91425" wrap="square" tIns="91425">
-            <a:noAutofit/>
-          </a:bodyPr>
-          <a:lstStyle/>
-          <a:p>
-            <a:pPr indent="0" lvl="0" marL="0" rtl="0" algn="l">
-              <a:spcBef>
-                <a:spcPts val="0"/>
-              </a:spcBef>
-              <a:spcAft>
-                <a:spcPts val="0"/>
-              </a:spcAft>
-              <a:buNone/>
-            </a:pPr>
-            <a:r>
-              <a:rPr lang="pt-BR"/>
-              <a:t>INTRODUÇÃO</a:t>
-            </a:r>
-            <a:endParaRPr/>
-          </a:p>
-        </p:txBody>
-      </p:sp>
-    </p:spTree>
-  </p:cSld>
-  <p:clrMapOvr>
-    <a:masterClrMapping/>
-  </p:clrMapOvr>
-</p:sld>
-</file>
-
-<file path=ppt/slides/slide20.xml><?xml version="1.0" encoding="utf-8"?>
-<p:sld xmlns:a="http://schemas.openxmlformats.org/drawingml/2006/main" xmlns:r="http://schemas.openxmlformats.org/officeDocument/2006/relationships" xmlns:mc="http://schemas.openxmlformats.org/markup-compatibility/2006" xmlns:mv="urn:schemas-microsoft-com:mac:vml" xmlns:p="http://schemas.openxmlformats.org/presentationml/2006/main" xmlns:c="http://schemas.openxmlformats.org/drawingml/2006/chart" xmlns:dgm="http://schemas.openxmlformats.org/drawingml/2006/diagram" xmlns:o="urn:schemas-microsoft-com:office:office" xmlns:v="urn:schemas-microsoft-com:vml" xmlns:pvml="urn:schemas-microsoft-com:office:powerpoint" xmlns:com="http://schemas.openxmlformats.org/drawingml/2006/compatibility" xmlns:p14="http://schemas.microsoft.com/office/powerpoint/2010/main" xmlns:p15="http://schemas.microsoft.com/office/powerpoint/2012/main" xmlns:ahyp="http://schemas.microsoft.com/office/drawing/2018/hyperlinkcolor">
-  <p:cSld>
-    <p:spTree>
-      <p:nvGrpSpPr>
-        <p:cNvPr id="253" name="Shape 253"/>
-        <p:cNvGrpSpPr/>
-        <p:nvPr/>
-      </p:nvGrpSpPr>
-      <p:grpSpPr>
-        <a:xfrm>
-          <a:off x="0" y="0"/>
-          <a:ext cx="0" cy="0"/>
-          <a:chOff x="0" y="0"/>
-          <a:chExt cx="0" cy="0"/>
-        </a:xfrm>
-      </p:grpSpPr>
-      <p:sp>
-        <p:nvSpPr>
-          <p:cNvPr id="254" name="Google Shape;254;p44"/>
+          <p:cNvPr id="260" name="Google Shape;260;p45"/>
           <p:cNvSpPr txBox="1"/>
           <p:nvPr>
             <p:ph type="ctrTitle"/>
@@ -16025,16 +16222,16 @@
               <a:buNone/>
             </a:pPr>
             <a:r>
-              <a:rPr b="1" lang="pt-BR"/>
-              <a:t>BILL: UMA APLICAÇÃO MÓVEL PARA GERENCIAMENTO FINANCEIRO PESSOAL</a:t>
+              <a:rPr b="1" lang="pt-BR" sz="3300"/>
+              <a:t>BILL: DESENVOLVIMENTO E VALIDAÇÃO DE UMA APLICAÇÃO MÓVEL PARA GERENCIAMENTO FINANCEIRO PESSOAL</a:t>
             </a:r>
-            <a:endParaRPr b="1"/>
+            <a:endParaRPr b="1" sz="3300"/>
           </a:p>
         </p:txBody>
       </p:sp>
       <p:sp>
         <p:nvSpPr>
-          <p:cNvPr id="255" name="Google Shape;255;p44"/>
+          <p:cNvPr id="261" name="Google Shape;261;p45"/>
           <p:cNvSpPr txBox="1"/>
           <p:nvPr>
             <p:ph idx="1" type="subTitle"/>
@@ -16620,7 +16817,7 @@
             </a:pPr>
             <a:r>
               <a:rPr lang="pt-BR" sz="1400"/>
-              <a:t>Controle financeiro e Finanças</a:t>
+              <a:t>Controle financeiro e Tecnologia</a:t>
             </a:r>
             <a:endParaRPr sz="1400"/>
           </a:p>
@@ -17476,9 +17673,9 @@
 </file>
 
 <file path=ppt/theme/theme1.xml><?xml version="1.0" encoding="utf-8"?>
-<a:theme xmlns:a="http://schemas.openxmlformats.org/drawingml/2006/main" xmlns:r="http://schemas.openxmlformats.org/officeDocument/2006/relationships">
+<a:theme xmlns:a="http://schemas.openxmlformats.org/drawingml/2006/main" xmlns:r="http://schemas.openxmlformats.org/officeDocument/2006/relationships" name="Simple Light">
   <a:themeElements>
-    <a:clrScheme name="Default">
+    <a:clrScheme name="Simple Light">
       <a:dk1>
         <a:srgbClr val="000000"/>
       </a:dk1>
@@ -17486,34 +17683,34 @@
         <a:srgbClr val="FFFFFF"/>
       </a:lt1>
       <a:dk2>
-        <a:srgbClr val="158158"/>
+        <a:srgbClr val="595959"/>
       </a:dk2>
       <a:lt2>
-        <a:srgbClr val="F3F3F3"/>
+        <a:srgbClr val="EEEEEE"/>
       </a:lt2>
       <a:accent1>
-        <a:srgbClr val="058DC7"/>
+        <a:srgbClr val="FFAB40"/>
       </a:accent1>
       <a:accent2>
-        <a:srgbClr val="50B432"/>
+        <a:srgbClr val="212121"/>
       </a:accent2>
       <a:accent3>
-        <a:srgbClr val="ED561B"/>
+        <a:srgbClr val="78909C"/>
       </a:accent3>
       <a:accent4>
-        <a:srgbClr val="EDEF00"/>
+        <a:srgbClr val="FFAB40"/>
       </a:accent4>
       <a:accent5>
-        <a:srgbClr val="24CBE5"/>
+        <a:srgbClr val="0097A7"/>
       </a:accent5>
       <a:accent6>
-        <a:srgbClr val="64E572"/>
+        <a:srgbClr val="EEFF41"/>
       </a:accent6>
       <a:hlink>
-        <a:srgbClr val="2200CC"/>
+        <a:srgbClr val="0097A7"/>
       </a:hlink>
       <a:folHlink>
-        <a:srgbClr val="551A8B"/>
+        <a:srgbClr val="0097A7"/>
       </a:folHlink>
     </a:clrScheme>
     <a:fontScheme name="Office">
@@ -17755,9 +17952,9 @@
 </file>
 
 <file path=ppt/theme/theme2.xml><?xml version="1.0" encoding="utf-8"?>
-<a:theme xmlns:a="http://schemas.openxmlformats.org/drawingml/2006/main" xmlns:r="http://schemas.openxmlformats.org/officeDocument/2006/relationships" name="Simple Light">
+<a:theme xmlns:a="http://schemas.openxmlformats.org/drawingml/2006/main" xmlns:r="http://schemas.openxmlformats.org/officeDocument/2006/relationships">
   <a:themeElements>
-    <a:clrScheme name="Simple Light">
+    <a:clrScheme name="Default">
       <a:dk1>
         <a:srgbClr val="000000"/>
       </a:dk1>
@@ -17765,34 +17962,34 @@
         <a:srgbClr val="FFFFFF"/>
       </a:lt1>
       <a:dk2>
-        <a:srgbClr val="595959"/>
+        <a:srgbClr val="158158"/>
       </a:dk2>
       <a:lt2>
-        <a:srgbClr val="EEEEEE"/>
+        <a:srgbClr val="F3F3F3"/>
       </a:lt2>
       <a:accent1>
-        <a:srgbClr val="FFAB40"/>
+        <a:srgbClr val="058DC7"/>
       </a:accent1>
       <a:accent2>
-        <a:srgbClr val="212121"/>
+        <a:srgbClr val="50B432"/>
       </a:accent2>
       <a:accent3>
-        <a:srgbClr val="78909C"/>
+        <a:srgbClr val="ED561B"/>
       </a:accent3>
       <a:accent4>
-        <a:srgbClr val="FFAB40"/>
+        <a:srgbClr val="EDEF00"/>
       </a:accent4>
       <a:accent5>
-        <a:srgbClr val="0097A7"/>
+        <a:srgbClr val="24CBE5"/>
       </a:accent5>
       <a:accent6>
-        <a:srgbClr val="EEFF41"/>
+        <a:srgbClr val="64E572"/>
       </a:accent6>
       <a:hlink>
-        <a:srgbClr val="0097A7"/>
+        <a:srgbClr val="2200CC"/>
       </a:hlink>
       <a:folHlink>
-        <a:srgbClr val="0097A7"/>
+        <a:srgbClr val="551A8B"/>
       </a:folHlink>
     </a:clrScheme>
     <a:fontScheme name="Office">

</xml_diff>